<commit_message>
add resources to slide
</commit_message>
<xml_diff>
--- a/learn-git.pptx
+++ b/learn-git.pptx
@@ -5,7 +5,7 @@
     <p:sldMasterId id="2147483648" r:id="rId1"/>
   </p:sldMasterIdLst>
   <p:notesMasterIdLst>
-    <p:notesMasterId r:id="rId16"/>
+    <p:notesMasterId r:id="rId18"/>
   </p:notesMasterIdLst>
   <p:sldIdLst>
     <p:sldId id="256" r:id="rId2"/>
@@ -22,6 +22,8 @@
     <p:sldId id="270" r:id="rId13"/>
     <p:sldId id="271" r:id="rId14"/>
     <p:sldId id="259" r:id="rId15"/>
+    <p:sldId id="272" r:id="rId16"/>
+    <p:sldId id="273" r:id="rId17"/>
   </p:sldIdLst>
   <p:sldSz cx="12192000" cy="6858000"/>
   <p:notesSz cx="6858000" cy="9144000"/>
@@ -8187,6 +8189,231 @@
 </p:sld>
 </file>
 
+<file path=ppt/slides/slide15.xml><?xml version="1.0" encoding="utf-8"?>
+<p:sld xmlns:a="http://schemas.openxmlformats.org/drawingml/2006/main" xmlns:r="http://schemas.openxmlformats.org/officeDocument/2006/relationships" xmlns:p="http://schemas.openxmlformats.org/presentationml/2006/main">
+  <p:cSld>
+    <p:spTree>
+      <p:nvGrpSpPr>
+        <p:cNvPr id="1" name=""/>
+        <p:cNvGrpSpPr/>
+        <p:nvPr/>
+      </p:nvGrpSpPr>
+      <p:grpSpPr>
+        <a:xfrm>
+          <a:off x="0" y="0"/>
+          <a:ext cx="0" cy="0"/>
+          <a:chOff x="0" y="0"/>
+          <a:chExt cx="0" cy="0"/>
+        </a:xfrm>
+      </p:grpSpPr>
+      <p:sp>
+        <p:nvSpPr>
+          <p:cNvPr id="2" name="Title 1"/>
+          <p:cNvSpPr>
+            <a:spLocks noGrp="1"/>
+          </p:cNvSpPr>
+          <p:nvPr>
+            <p:ph type="title"/>
+          </p:nvPr>
+        </p:nvSpPr>
+        <p:spPr/>
+        <p:txBody>
+          <a:bodyPr/>
+          <a:lstStyle/>
+          <a:p>
+            <a:r>
+              <a:rPr lang="en-US" dirty="0" smtClean="0"/>
+              <a:t>Resources</a:t>
+            </a:r>
+            <a:endParaRPr lang="en-US" dirty="0"/>
+          </a:p>
+        </p:txBody>
+      </p:sp>
+      <p:sp>
+        <p:nvSpPr>
+          <p:cNvPr id="3" name="Content Placeholder 2"/>
+          <p:cNvSpPr>
+            <a:spLocks noGrp="1"/>
+          </p:cNvSpPr>
+          <p:nvPr>
+            <p:ph idx="1"/>
+          </p:nvPr>
+        </p:nvSpPr>
+        <p:spPr/>
+        <p:txBody>
+          <a:bodyPr/>
+          <a:lstStyle/>
+          <a:p>
+            <a:r>
+              <a:rPr lang="en-US" dirty="0" smtClean="0"/>
+              <a:t>Pro </a:t>
+            </a:r>
+            <a:r>
+              <a:rPr lang="en-US" dirty="0" err="1" smtClean="0"/>
+              <a:t>Git</a:t>
+            </a:r>
+            <a:r>
+              <a:rPr lang="en-US" dirty="0" smtClean="0"/>
+              <a:t> (Book) </a:t>
+            </a:r>
+            <a:r>
+              <a:rPr lang="en-US" dirty="0"/>
+              <a:t>- </a:t>
+            </a:r>
+            <a:r>
+              <a:rPr lang="en-US" dirty="0">
+                <a:hlinkClick r:id="rId2"/>
+              </a:rPr>
+              <a:t>https://</a:t>
+            </a:r>
+            <a:r>
+              <a:rPr lang="en-US" dirty="0" smtClean="0">
+                <a:hlinkClick r:id="rId2"/>
+              </a:rPr>
+              <a:t>git-scm.com/book/en/v2</a:t>
+            </a:r>
+            <a:endParaRPr lang="en-US" dirty="0" smtClean="0"/>
+          </a:p>
+          <a:p>
+            <a:r>
+              <a:rPr lang="en-US" dirty="0"/>
+              <a:t>The small game - </a:t>
+            </a:r>
+            <a:r>
+              <a:rPr lang="en-US" dirty="0">
+                <a:hlinkClick r:id="rId3"/>
+              </a:rPr>
+              <a:t>https://</a:t>
+            </a:r>
+            <a:r>
+              <a:rPr lang="en-US" dirty="0" smtClean="0">
+                <a:hlinkClick r:id="rId3"/>
+              </a:rPr>
+              <a:t>github.com/pswai/learn-git</a:t>
+            </a:r>
+            <a:endParaRPr lang="en-US" dirty="0" smtClean="0"/>
+          </a:p>
+          <a:p>
+            <a:r>
+              <a:rPr lang="en-US" dirty="0" err="1" smtClean="0"/>
+              <a:t>Git</a:t>
+            </a:r>
+            <a:r>
+              <a:rPr lang="en-US" dirty="0" smtClean="0"/>
+              <a:t> </a:t>
+            </a:r>
+            <a:r>
+              <a:rPr lang="en-US" dirty="0" err="1" smtClean="0"/>
+              <a:t>cheatsheet</a:t>
+            </a:r>
+            <a:r>
+              <a:rPr lang="en-US" dirty="0"/>
+              <a:t> - </a:t>
+            </a:r>
+            <a:r>
+              <a:rPr lang="en-US" dirty="0">
+                <a:hlinkClick r:id="rId4"/>
+              </a:rPr>
+              <a:t>https://</a:t>
+            </a:r>
+            <a:r>
+              <a:rPr lang="en-US" dirty="0" smtClean="0">
+                <a:hlinkClick r:id="rId4"/>
+              </a:rPr>
+              <a:t>services.github.com/kit/downloads/github-git-cheat-sheet.pdf</a:t>
+            </a:r>
+            <a:endParaRPr lang="en-US" dirty="0" smtClean="0"/>
+          </a:p>
+          <a:p>
+            <a:endParaRPr lang="en-US" dirty="0"/>
+          </a:p>
+        </p:txBody>
+      </p:sp>
+    </p:spTree>
+    <p:extLst>
+      <p:ext uri="{BB962C8B-B14F-4D97-AF65-F5344CB8AC3E}">
+        <p14:creationId xmlns:p14="http://schemas.microsoft.com/office/powerpoint/2010/main" val="543777433"/>
+      </p:ext>
+    </p:extLst>
+  </p:cSld>
+  <p:clrMapOvr>
+    <a:masterClrMapping/>
+  </p:clrMapOvr>
+</p:sld>
+</file>
+
+<file path=ppt/slides/slide16.xml><?xml version="1.0" encoding="utf-8"?>
+<p:sld xmlns:a="http://schemas.openxmlformats.org/drawingml/2006/main" xmlns:r="http://schemas.openxmlformats.org/officeDocument/2006/relationships" xmlns:p="http://schemas.openxmlformats.org/presentationml/2006/main">
+  <p:cSld>
+    <p:spTree>
+      <p:nvGrpSpPr>
+        <p:cNvPr id="1" name=""/>
+        <p:cNvGrpSpPr/>
+        <p:nvPr/>
+      </p:nvGrpSpPr>
+      <p:grpSpPr>
+        <a:xfrm>
+          <a:off x="0" y="0"/>
+          <a:ext cx="0" cy="0"/>
+          <a:chOff x="0" y="0"/>
+          <a:chExt cx="0" cy="0"/>
+        </a:xfrm>
+      </p:grpSpPr>
+      <p:sp>
+        <p:nvSpPr>
+          <p:cNvPr id="2" name="Title 1"/>
+          <p:cNvSpPr>
+            <a:spLocks noGrp="1"/>
+          </p:cNvSpPr>
+          <p:nvPr>
+            <p:ph type="title"/>
+          </p:nvPr>
+        </p:nvSpPr>
+        <p:spPr/>
+        <p:txBody>
+          <a:bodyPr/>
+          <a:lstStyle/>
+          <a:p>
+            <a:r>
+              <a:rPr lang="en-US" dirty="0" smtClean="0"/>
+              <a:t>QUESTIONs?</a:t>
+            </a:r>
+            <a:endParaRPr lang="en-US" dirty="0"/>
+          </a:p>
+        </p:txBody>
+      </p:sp>
+      <p:sp>
+        <p:nvSpPr>
+          <p:cNvPr id="3" name="Text Placeholder 2"/>
+          <p:cNvSpPr>
+            <a:spLocks noGrp="1"/>
+          </p:cNvSpPr>
+          <p:nvPr>
+            <p:ph type="body" idx="1"/>
+          </p:nvPr>
+        </p:nvSpPr>
+        <p:spPr/>
+        <p:txBody>
+          <a:bodyPr/>
+          <a:lstStyle/>
+          <a:p>
+            <a:endParaRPr lang="en-US"/>
+          </a:p>
+        </p:txBody>
+      </p:sp>
+    </p:spTree>
+    <p:extLst>
+      <p:ext uri="{BB962C8B-B14F-4D97-AF65-F5344CB8AC3E}">
+        <p14:creationId xmlns:p14="http://schemas.microsoft.com/office/powerpoint/2010/main" val="2098455748"/>
+      </p:ext>
+    </p:extLst>
+  </p:cSld>
+  <p:clrMapOvr>
+    <a:masterClrMapping/>
+  </p:clrMapOvr>
+</p:sld>
+</file>
+
 <file path=ppt/slides/slide2.xml><?xml version="1.0" encoding="utf-8"?>
 <p:sld xmlns:a="http://schemas.openxmlformats.org/drawingml/2006/main" xmlns:r="http://schemas.openxmlformats.org/officeDocument/2006/relationships" xmlns:p="http://schemas.openxmlformats.org/presentationml/2006/main">
   <p:cSld>
@@ -8506,11 +8733,7 @@
             </a:r>
             <a:r>
               <a:rPr lang="en-US" dirty="0" smtClean="0"/>
-              <a:t> </a:t>
-            </a:r>
-            <a:r>
-              <a:rPr lang="en-US" dirty="0" smtClean="0"/>
-              <a:t>status</a:t>
+              <a:t> status</a:t>
             </a:r>
           </a:p>
           <a:p>
@@ -8520,11 +8743,7 @@
             </a:r>
             <a:r>
               <a:rPr lang="en-US" dirty="0" smtClean="0"/>
-              <a:t> </a:t>
-            </a:r>
-            <a:r>
-              <a:rPr lang="en-US" dirty="0" smtClean="0"/>
-              <a:t>log</a:t>
+              <a:t> log</a:t>
             </a:r>
           </a:p>
           <a:p>
@@ -8548,13 +8767,6 @@
               </a:rPr>
               <a:t> merge</a:t>
             </a:r>
-            <a:endParaRPr lang="en-US" dirty="0" smtClean="0">
-              <a:solidFill>
-                <a:schemeClr val="bg1">
-                  <a:lumMod val="75000"/>
-                </a:schemeClr>
-              </a:solidFill>
-            </a:endParaRPr>
           </a:p>
           <a:p>
             <a:r>

</xml_diff>

<commit_message>
update title in slide
</commit_message>
<xml_diff>
--- a/learn-git.pptx
+++ b/learn-git.pptx
@@ -8874,8 +8874,12 @@
               <a:t>Git</a:t>
             </a:r>
             <a:r>
+              <a:rPr lang="en-US" dirty="0"/>
+              <a:t> </a:t>
+            </a:r>
+            <a:r>
               <a:rPr lang="en-US" dirty="0" smtClean="0"/>
-              <a:t> – this week</a:t>
+              <a:t>– right now</a:t>
             </a:r>
             <a:endParaRPr lang="en-US" dirty="0"/>
           </a:p>

</xml_diff>